<commit_message>
Added images to lection
</commit_message>
<xml_diff>
--- a/07.string-operations.pptx
+++ b/07.string-operations.pptx
@@ -182,7 +182,7 @@
           <a:noFill/>
           <a:extLst>
             <a:ext uri="{909E8E84-426E-40dd-AFC4-6F175D3DCCD1}">
-              <a14:hiddenFill xmlns="" xmlns:a14="http://schemas.microsoft.com/office/drawing/2010/main">
+              <a14:hiddenFill xmlns:a14="http://schemas.microsoft.com/office/drawing/2010/main" xmlns="">
                 <a:solidFill>
                   <a:srgbClr val="FFFFFF"/>
                 </a:solidFill>
@@ -242,7 +242,7 @@
             </a:ln>
             <a:extLst>
               <a:ext uri="{91240B29-F687-4f45-9708-019B960494DF}">
-                <a14:hiddenLine xmlns="" xmlns:a14="http://schemas.microsoft.com/office/drawing/2010/main" w="9525">
+                <a14:hiddenLine xmlns:a14="http://schemas.microsoft.com/office/drawing/2010/main" xmlns="" w="9525">
                   <a:solidFill>
                     <a:srgbClr val="000000"/>
                   </a:solidFill>
@@ -332,7 +332,7 @@
             </a:ln>
             <a:extLst>
               <a:ext uri="{91240B29-F687-4f45-9708-019B960494DF}">
-                <a14:hiddenLine xmlns="" xmlns:a14="http://schemas.microsoft.com/office/drawing/2010/main" w="9525">
+                <a14:hiddenLine xmlns:a14="http://schemas.microsoft.com/office/drawing/2010/main" xmlns="" w="9525">
                   <a:solidFill>
                     <a:srgbClr val="000000"/>
                   </a:solidFill>
@@ -422,7 +422,7 @@
             </a:ln>
             <a:extLst>
               <a:ext uri="{91240B29-F687-4f45-9708-019B960494DF}">
-                <a14:hiddenLine xmlns="" xmlns:a14="http://schemas.microsoft.com/office/drawing/2010/main" w="9525">
+                <a14:hiddenLine xmlns:a14="http://schemas.microsoft.com/office/drawing/2010/main" xmlns="" w="9525">
                   <a:solidFill>
                     <a:srgbClr val="000000"/>
                   </a:solidFill>
@@ -456,7 +456,7 @@
             </a:ln>
             <a:extLst>
               <a:ext uri="{91240B29-F687-4f45-9708-019B960494DF}">
-                <a14:hiddenLine xmlns="" xmlns:a14="http://schemas.microsoft.com/office/drawing/2010/main" w="9525">
+                <a14:hiddenLine xmlns:a14="http://schemas.microsoft.com/office/drawing/2010/main" xmlns="" w="9525">
                   <a:solidFill>
                     <a:srgbClr val="000000"/>
                   </a:solidFill>
@@ -546,7 +546,7 @@
             </a:ln>
             <a:extLst>
               <a:ext uri="{91240B29-F687-4f45-9708-019B960494DF}">
-                <a14:hiddenLine xmlns="" xmlns:a14="http://schemas.microsoft.com/office/drawing/2010/main" w="9525">
+                <a14:hiddenLine xmlns:a14="http://schemas.microsoft.com/office/drawing/2010/main" xmlns="" w="9525">
                   <a:solidFill>
                     <a:srgbClr val="000000"/>
                   </a:solidFill>
@@ -608,7 +608,7 @@
             </a:ln>
             <a:extLst>
               <a:ext uri="{91240B29-F687-4f45-9708-019B960494DF}">
-                <a14:hiddenLine xmlns="" xmlns:a14="http://schemas.microsoft.com/office/drawing/2010/main" w="9525">
+                <a14:hiddenLine xmlns:a14="http://schemas.microsoft.com/office/drawing/2010/main" xmlns="" w="9525">
                   <a:solidFill>
                     <a:srgbClr val="000000"/>
                   </a:solidFill>
@@ -670,7 +670,7 @@
             </a:ln>
             <a:extLst>
               <a:ext uri="{91240B29-F687-4f45-9708-019B960494DF}">
-                <a14:hiddenLine xmlns="" xmlns:a14="http://schemas.microsoft.com/office/drawing/2010/main" w="9525">
+                <a14:hiddenLine xmlns:a14="http://schemas.microsoft.com/office/drawing/2010/main" xmlns="" w="9525">
                   <a:solidFill>
                     <a:srgbClr val="000000"/>
                   </a:solidFill>
@@ -760,7 +760,7 @@
             </a:ln>
             <a:extLst>
               <a:ext uri="{91240B29-F687-4f45-9708-019B960494DF}">
-                <a14:hiddenLine xmlns="" xmlns:a14="http://schemas.microsoft.com/office/drawing/2010/main" w="9525">
+                <a14:hiddenLine xmlns:a14="http://schemas.microsoft.com/office/drawing/2010/main" xmlns="" w="9525">
                   <a:solidFill>
                     <a:srgbClr val="000000"/>
                   </a:solidFill>
@@ -822,7 +822,7 @@
             </a:ln>
             <a:extLst>
               <a:ext uri="{91240B29-F687-4f45-9708-019B960494DF}">
-                <a14:hiddenLine xmlns="" xmlns:a14="http://schemas.microsoft.com/office/drawing/2010/main" w="9525">
+                <a14:hiddenLine xmlns:a14="http://schemas.microsoft.com/office/drawing/2010/main" xmlns="" w="9525">
                   <a:solidFill>
                     <a:srgbClr val="000000"/>
                   </a:solidFill>
@@ -884,7 +884,7 @@
             </a:ln>
             <a:extLst>
               <a:ext uri="{91240B29-F687-4f45-9708-019B960494DF}">
-                <a14:hiddenLine xmlns="" xmlns:a14="http://schemas.microsoft.com/office/drawing/2010/main" w="9525">
+                <a14:hiddenLine xmlns:a14="http://schemas.microsoft.com/office/drawing/2010/main" xmlns="" w="9525">
                   <a:solidFill>
                     <a:srgbClr val="000000"/>
                   </a:solidFill>
@@ -974,7 +974,7 @@
             </a:ln>
             <a:extLst>
               <a:ext uri="{91240B29-F687-4f45-9708-019B960494DF}">
-                <a14:hiddenLine xmlns="" xmlns:a14="http://schemas.microsoft.com/office/drawing/2010/main" w="9525">
+                <a14:hiddenLine xmlns:a14="http://schemas.microsoft.com/office/drawing/2010/main" xmlns="" w="9525">
                   <a:solidFill>
                     <a:srgbClr val="000000"/>
                   </a:solidFill>
@@ -1064,7 +1064,7 @@
             </a:ln>
             <a:extLst>
               <a:ext uri="{91240B29-F687-4f45-9708-019B960494DF}">
-                <a14:hiddenLine xmlns="" xmlns:a14="http://schemas.microsoft.com/office/drawing/2010/main" w="9525">
+                <a14:hiddenLine xmlns:a14="http://schemas.microsoft.com/office/drawing/2010/main" xmlns="" w="9525">
                   <a:solidFill>
                     <a:srgbClr val="000000"/>
                   </a:solidFill>
@@ -1126,7 +1126,7 @@
             </a:ln>
             <a:extLst>
               <a:ext uri="{91240B29-F687-4f45-9708-019B960494DF}">
-                <a14:hiddenLine xmlns="" xmlns:a14="http://schemas.microsoft.com/office/drawing/2010/main" w="9525">
+                <a14:hiddenLine xmlns:a14="http://schemas.microsoft.com/office/drawing/2010/main" xmlns="" w="9525">
                   <a:solidFill>
                     <a:srgbClr val="000000"/>
                   </a:solidFill>
@@ -1236,7 +1236,7 @@
             </a:ln>
             <a:extLst>
               <a:ext uri="{91240B29-F687-4f45-9708-019B960494DF}">
-                <a14:hiddenLine xmlns="" xmlns:a14="http://schemas.microsoft.com/office/drawing/2010/main" w="9525">
+                <a14:hiddenLine xmlns:a14="http://schemas.microsoft.com/office/drawing/2010/main" xmlns="" w="9525">
                   <a:solidFill>
                     <a:srgbClr val="000000"/>
                   </a:solidFill>
@@ -1298,7 +1298,7 @@
             </a:ln>
             <a:extLst>
               <a:ext uri="{91240B29-F687-4f45-9708-019B960494DF}">
-                <a14:hiddenLine xmlns="" xmlns:a14="http://schemas.microsoft.com/office/drawing/2010/main" w="9525">
+                <a14:hiddenLine xmlns:a14="http://schemas.microsoft.com/office/drawing/2010/main" xmlns="" w="9525">
                   <a:solidFill>
                     <a:srgbClr val="000000"/>
                   </a:solidFill>
@@ -1388,7 +1388,7 @@
             </a:ln>
             <a:extLst>
               <a:ext uri="{91240B29-F687-4f45-9708-019B960494DF}">
-                <a14:hiddenLine xmlns="" xmlns:a14="http://schemas.microsoft.com/office/drawing/2010/main" w="9525">
+                <a14:hiddenLine xmlns:a14="http://schemas.microsoft.com/office/drawing/2010/main" xmlns="" w="9525">
                   <a:solidFill>
                     <a:srgbClr val="000000"/>
                   </a:solidFill>
@@ -1478,7 +1478,7 @@
             </a:ln>
             <a:extLst>
               <a:ext uri="{91240B29-F687-4f45-9708-019B960494DF}">
-                <a14:hiddenLine xmlns="" xmlns:a14="http://schemas.microsoft.com/office/drawing/2010/main" w="9525">
+                <a14:hiddenLine xmlns:a14="http://schemas.microsoft.com/office/drawing/2010/main" xmlns="" w="9525">
                   <a:solidFill>
                     <a:srgbClr val="000000"/>
                   </a:solidFill>
@@ -1540,7 +1540,7 @@
             </a:ln>
             <a:extLst>
               <a:ext uri="{91240B29-F687-4f45-9708-019B960494DF}">
-                <a14:hiddenLine xmlns="" xmlns:a14="http://schemas.microsoft.com/office/drawing/2010/main" w="9525">
+                <a14:hiddenLine xmlns:a14="http://schemas.microsoft.com/office/drawing/2010/main" xmlns="" w="9525">
                   <a:solidFill>
                     <a:srgbClr val="000000"/>
                   </a:solidFill>
@@ -1630,7 +1630,7 @@
             </a:ln>
             <a:extLst>
               <a:ext uri="{91240B29-F687-4f45-9708-019B960494DF}">
-                <a14:hiddenLine xmlns="" xmlns:a14="http://schemas.microsoft.com/office/drawing/2010/main" w="9525">
+                <a14:hiddenLine xmlns:a14="http://schemas.microsoft.com/office/drawing/2010/main" xmlns="" w="9525">
                   <a:solidFill>
                     <a:srgbClr val="000000"/>
                   </a:solidFill>
@@ -1720,7 +1720,7 @@
             </a:ln>
             <a:extLst>
               <a:ext uri="{91240B29-F687-4f45-9708-019B960494DF}">
-                <a14:hiddenLine xmlns="" xmlns:a14="http://schemas.microsoft.com/office/drawing/2010/main" w="9525">
+                <a14:hiddenLine xmlns:a14="http://schemas.microsoft.com/office/drawing/2010/main" xmlns="" w="9525">
                   <a:solidFill>
                     <a:srgbClr val="000000"/>
                   </a:solidFill>
@@ -1776,7 +1776,7 @@
             </a:ln>
             <a:extLst>
               <a:ext uri="{91240B29-F687-4f45-9708-019B960494DF}">
-                <a14:hiddenLine xmlns="" xmlns:a14="http://schemas.microsoft.com/office/drawing/2010/main" w="9525">
+                <a14:hiddenLine xmlns:a14="http://schemas.microsoft.com/office/drawing/2010/main" xmlns="" w="9525">
                   <a:solidFill>
                     <a:srgbClr val="000000"/>
                   </a:solidFill>
@@ -1866,7 +1866,7 @@
             </a:ln>
             <a:extLst>
               <a:ext uri="{91240B29-F687-4f45-9708-019B960494DF}">
-                <a14:hiddenLine xmlns="" xmlns:a14="http://schemas.microsoft.com/office/drawing/2010/main" w="9525">
+                <a14:hiddenLine xmlns:a14="http://schemas.microsoft.com/office/drawing/2010/main" xmlns="" w="9525">
                   <a:solidFill>
                     <a:srgbClr val="000000"/>
                   </a:solidFill>
@@ -1922,7 +1922,7 @@
             </a:ln>
             <a:extLst>
               <a:ext uri="{91240B29-F687-4f45-9708-019B960494DF}">
-                <a14:hiddenLine xmlns="" xmlns:a14="http://schemas.microsoft.com/office/drawing/2010/main" w="9525">
+                <a14:hiddenLine xmlns:a14="http://schemas.microsoft.com/office/drawing/2010/main" xmlns="" w="9525">
                   <a:solidFill>
                     <a:srgbClr val="000000"/>
                   </a:solidFill>
@@ -2012,7 +2012,7 @@
             </a:ln>
             <a:extLst>
               <a:ext uri="{91240B29-F687-4f45-9708-019B960494DF}">
-                <a14:hiddenLine xmlns="" xmlns:a14="http://schemas.microsoft.com/office/drawing/2010/main" w="9525">
+                <a14:hiddenLine xmlns:a14="http://schemas.microsoft.com/office/drawing/2010/main" xmlns="" w="9525">
                   <a:solidFill>
                     <a:srgbClr val="000000"/>
                   </a:solidFill>
@@ -2080,7 +2080,7 @@
             </a:ln>
             <a:extLst>
               <a:ext uri="{91240B29-F687-4f45-9708-019B960494DF}">
-                <a14:hiddenLine xmlns="" xmlns:a14="http://schemas.microsoft.com/office/drawing/2010/main" w="9525">
+                <a14:hiddenLine xmlns:a14="http://schemas.microsoft.com/office/drawing/2010/main" xmlns="" w="9525">
                   <a:solidFill>
                     <a:srgbClr val="000000"/>
                   </a:solidFill>
@@ -2170,7 +2170,7 @@
             </a:ln>
             <a:extLst>
               <a:ext uri="{91240B29-F687-4f45-9708-019B960494DF}">
-                <a14:hiddenLine xmlns="" xmlns:a14="http://schemas.microsoft.com/office/drawing/2010/main" w="9525">
+                <a14:hiddenLine xmlns:a14="http://schemas.microsoft.com/office/drawing/2010/main" xmlns="" w="9525">
                   <a:solidFill>
                     <a:srgbClr val="000000"/>
                   </a:solidFill>
@@ -2238,7 +2238,7 @@
             </a:ln>
             <a:extLst>
               <a:ext uri="{91240B29-F687-4f45-9708-019B960494DF}">
-                <a14:hiddenLine xmlns="" xmlns:a14="http://schemas.microsoft.com/office/drawing/2010/main" w="9525">
+                <a14:hiddenLine xmlns:a14="http://schemas.microsoft.com/office/drawing/2010/main" xmlns="" w="9525">
                   <a:solidFill>
                     <a:srgbClr val="000000"/>
                   </a:solidFill>
@@ -2328,7 +2328,7 @@
             </a:ln>
             <a:extLst>
               <a:ext uri="{91240B29-F687-4f45-9708-019B960494DF}">
-                <a14:hiddenLine xmlns="" xmlns:a14="http://schemas.microsoft.com/office/drawing/2010/main" w="9525">
+                <a14:hiddenLine xmlns:a14="http://schemas.microsoft.com/office/drawing/2010/main" xmlns="" w="9525">
                   <a:solidFill>
                     <a:srgbClr val="000000"/>
                   </a:solidFill>
@@ -2362,7 +2362,7 @@
             </a:ln>
             <a:extLst>
               <a:ext uri="{91240B29-F687-4f45-9708-019B960494DF}">
-                <a14:hiddenLine xmlns="" xmlns:a14="http://schemas.microsoft.com/office/drawing/2010/main" w="9525">
+                <a14:hiddenLine xmlns:a14="http://schemas.microsoft.com/office/drawing/2010/main" xmlns="" w="9525">
                   <a:solidFill>
                     <a:srgbClr val="000000"/>
                   </a:solidFill>
@@ -2452,7 +2452,7 @@
             </a:ln>
             <a:extLst>
               <a:ext uri="{91240B29-F687-4f45-9708-019B960494DF}">
-                <a14:hiddenLine xmlns="" xmlns:a14="http://schemas.microsoft.com/office/drawing/2010/main" w="9525">
+                <a14:hiddenLine xmlns:a14="http://schemas.microsoft.com/office/drawing/2010/main" xmlns="" w="9525">
                   <a:solidFill>
                     <a:srgbClr val="000000"/>
                   </a:solidFill>
@@ -2514,7 +2514,7 @@
             </a:ln>
             <a:extLst>
               <a:ext uri="{91240B29-F687-4f45-9708-019B960494DF}">
-                <a14:hiddenLine xmlns="" xmlns:a14="http://schemas.microsoft.com/office/drawing/2010/main" w="9525">
+                <a14:hiddenLine xmlns:a14="http://schemas.microsoft.com/office/drawing/2010/main" xmlns="" w="9525">
                   <a:solidFill>
                     <a:srgbClr val="000000"/>
                   </a:solidFill>
@@ -2576,7 +2576,7 @@
             </a:ln>
             <a:extLst>
               <a:ext uri="{91240B29-F687-4f45-9708-019B960494DF}">
-                <a14:hiddenLine xmlns="" xmlns:a14="http://schemas.microsoft.com/office/drawing/2010/main" w="9525">
+                <a14:hiddenLine xmlns:a14="http://schemas.microsoft.com/office/drawing/2010/main" xmlns="" w="9525">
                   <a:solidFill>
                     <a:srgbClr val="000000"/>
                   </a:solidFill>
@@ -2666,7 +2666,7 @@
             </a:ln>
             <a:extLst>
               <a:ext uri="{91240B29-F687-4f45-9708-019B960494DF}">
-                <a14:hiddenLine xmlns="" xmlns:a14="http://schemas.microsoft.com/office/drawing/2010/main" w="9525">
+                <a14:hiddenLine xmlns:a14="http://schemas.microsoft.com/office/drawing/2010/main" xmlns="" w="9525">
                   <a:solidFill>
                     <a:srgbClr val="000000"/>
                   </a:solidFill>
@@ -2734,7 +2734,7 @@
             </a:ln>
             <a:extLst>
               <a:ext uri="{91240B29-F687-4f45-9708-019B960494DF}">
-                <a14:hiddenLine xmlns="" xmlns:a14="http://schemas.microsoft.com/office/drawing/2010/main" w="9525">
+                <a14:hiddenLine xmlns:a14="http://schemas.microsoft.com/office/drawing/2010/main" xmlns="" w="9525">
                   <a:solidFill>
                     <a:srgbClr val="000000"/>
                   </a:solidFill>
@@ -2796,7 +2796,7 @@
             </a:ln>
             <a:extLst>
               <a:ext uri="{91240B29-F687-4f45-9708-019B960494DF}">
-                <a14:hiddenLine xmlns="" xmlns:a14="http://schemas.microsoft.com/office/drawing/2010/main" w="9525">
+                <a14:hiddenLine xmlns:a14="http://schemas.microsoft.com/office/drawing/2010/main" xmlns="" w="9525">
                   <a:solidFill>
                     <a:srgbClr val="000000"/>
                   </a:solidFill>
@@ -2886,7 +2886,7 @@
             </a:ln>
             <a:extLst>
               <a:ext uri="{91240B29-F687-4f45-9708-019B960494DF}">
-                <a14:hiddenLine xmlns="" xmlns:a14="http://schemas.microsoft.com/office/drawing/2010/main" w="9525">
+                <a14:hiddenLine xmlns:a14="http://schemas.microsoft.com/office/drawing/2010/main" xmlns="" w="9525">
                   <a:solidFill>
                     <a:srgbClr val="000000"/>
                   </a:solidFill>
@@ -2948,7 +2948,7 @@
             </a:ln>
             <a:extLst>
               <a:ext uri="{91240B29-F687-4f45-9708-019B960494DF}">
-                <a14:hiddenLine xmlns="" xmlns:a14="http://schemas.microsoft.com/office/drawing/2010/main" w="9525">
+                <a14:hiddenLine xmlns:a14="http://schemas.microsoft.com/office/drawing/2010/main" xmlns="" w="9525">
                   <a:solidFill>
                     <a:srgbClr val="000000"/>
                   </a:solidFill>
@@ -3038,7 +3038,7 @@
             </a:ln>
             <a:extLst>
               <a:ext uri="{91240B29-F687-4f45-9708-019B960494DF}">
-                <a14:hiddenLine xmlns="" xmlns:a14="http://schemas.microsoft.com/office/drawing/2010/main" w="9525">
+                <a14:hiddenLine xmlns:a14="http://schemas.microsoft.com/office/drawing/2010/main" xmlns="" w="9525">
                   <a:solidFill>
                     <a:srgbClr val="000000"/>
                   </a:solidFill>
@@ -3100,7 +3100,7 @@
             </a:ln>
             <a:extLst>
               <a:ext uri="{91240B29-F687-4f45-9708-019B960494DF}">
-                <a14:hiddenLine xmlns="" xmlns:a14="http://schemas.microsoft.com/office/drawing/2010/main" w="9525">
+                <a14:hiddenLine xmlns:a14="http://schemas.microsoft.com/office/drawing/2010/main" xmlns="" w="9525">
                   <a:solidFill>
                     <a:srgbClr val="000000"/>
                   </a:solidFill>
@@ -3190,7 +3190,7 @@
             </a:ln>
             <a:extLst>
               <a:ext uri="{91240B29-F687-4f45-9708-019B960494DF}">
-                <a14:hiddenLine xmlns="" xmlns:a14="http://schemas.microsoft.com/office/drawing/2010/main" w="9525">
+                <a14:hiddenLine xmlns:a14="http://schemas.microsoft.com/office/drawing/2010/main" xmlns="" w="9525">
                   <a:solidFill>
                     <a:srgbClr val="000000"/>
                   </a:solidFill>
@@ -3224,7 +3224,7 @@
             </a:ln>
             <a:extLst>
               <a:ext uri="{91240B29-F687-4f45-9708-019B960494DF}">
-                <a14:hiddenLine xmlns="" xmlns:a14="http://schemas.microsoft.com/office/drawing/2010/main" w="9525">
+                <a14:hiddenLine xmlns:a14="http://schemas.microsoft.com/office/drawing/2010/main" xmlns="" w="9525">
                   <a:solidFill>
                     <a:srgbClr val="000000"/>
                   </a:solidFill>
@@ -3289,7 +3289,7 @@
             </a:ln>
             <a:extLst>
               <a:ext uri="{91240B29-F687-4f45-9708-019B960494DF}">
-                <a14:hiddenLine xmlns="" xmlns:a14="http://schemas.microsoft.com/office/drawing/2010/main" w="9525">
+                <a14:hiddenLine xmlns:a14="http://schemas.microsoft.com/office/drawing/2010/main" xmlns="" w="9525">
                   <a:solidFill>
                     <a:srgbClr val="000000"/>
                   </a:solidFill>
@@ -3379,7 +3379,7 @@
             </a:ln>
             <a:extLst>
               <a:ext uri="{91240B29-F687-4f45-9708-019B960494DF}">
-                <a14:hiddenLine xmlns="" xmlns:a14="http://schemas.microsoft.com/office/drawing/2010/main" w="9525">
+                <a14:hiddenLine xmlns:a14="http://schemas.microsoft.com/office/drawing/2010/main" xmlns="" w="9525">
                   <a:solidFill>
                     <a:srgbClr val="000000"/>
                   </a:solidFill>
@@ -3441,7 +3441,7 @@
             </a:ln>
             <a:extLst>
               <a:ext uri="{91240B29-F687-4f45-9708-019B960494DF}">
-                <a14:hiddenLine xmlns="" xmlns:a14="http://schemas.microsoft.com/office/drawing/2010/main" w="9525">
+                <a14:hiddenLine xmlns:a14="http://schemas.microsoft.com/office/drawing/2010/main" xmlns="" w="9525">
                   <a:solidFill>
                     <a:srgbClr val="000000"/>
                   </a:solidFill>
@@ -3531,7 +3531,7 @@
             </a:ln>
             <a:extLst>
               <a:ext uri="{91240B29-F687-4f45-9708-019B960494DF}">
-                <a14:hiddenLine xmlns="" xmlns:a14="http://schemas.microsoft.com/office/drawing/2010/main" w="9525">
+                <a14:hiddenLine xmlns:a14="http://schemas.microsoft.com/office/drawing/2010/main" xmlns="" w="9525">
                   <a:solidFill>
                     <a:srgbClr val="000000"/>
                   </a:solidFill>
@@ -3621,7 +3621,7 @@
             </a:ln>
             <a:extLst>
               <a:ext uri="{91240B29-F687-4f45-9708-019B960494DF}">
-                <a14:hiddenLine xmlns="" xmlns:a14="http://schemas.microsoft.com/office/drawing/2010/main" w="9525">
+                <a14:hiddenLine xmlns:a14="http://schemas.microsoft.com/office/drawing/2010/main" xmlns="" w="9525">
                   <a:solidFill>
                     <a:srgbClr val="000000"/>
                   </a:solidFill>
@@ -3686,7 +3686,7 @@
             </a:ln>
             <a:extLst>
               <a:ext uri="{91240B29-F687-4f45-9708-019B960494DF}">
-                <a14:hiddenLine xmlns="" xmlns:a14="http://schemas.microsoft.com/office/drawing/2010/main" w="9525">
+                <a14:hiddenLine xmlns:a14="http://schemas.microsoft.com/office/drawing/2010/main" xmlns="" w="9525">
                   <a:solidFill>
                     <a:srgbClr val="000000"/>
                   </a:solidFill>
@@ -3748,7 +3748,7 @@
             </a:ln>
             <a:extLst>
               <a:ext uri="{91240B29-F687-4f45-9708-019B960494DF}">
-                <a14:hiddenLine xmlns="" xmlns:a14="http://schemas.microsoft.com/office/drawing/2010/main" w="9525">
+                <a14:hiddenLine xmlns:a14="http://schemas.microsoft.com/office/drawing/2010/main" xmlns="" w="9525">
                   <a:solidFill>
                     <a:srgbClr val="000000"/>
                   </a:solidFill>
@@ -3838,7 +3838,7 @@
             </a:ln>
             <a:extLst>
               <a:ext uri="{91240B29-F687-4f45-9708-019B960494DF}">
-                <a14:hiddenLine xmlns="" xmlns:a14="http://schemas.microsoft.com/office/drawing/2010/main" w="9525">
+                <a14:hiddenLine xmlns:a14="http://schemas.microsoft.com/office/drawing/2010/main" xmlns="" w="9525">
                   <a:solidFill>
                     <a:srgbClr val="000000"/>
                   </a:solidFill>
@@ -3928,7 +3928,7 @@
             </a:ln>
             <a:extLst>
               <a:ext uri="{91240B29-F687-4f45-9708-019B960494DF}">
-                <a14:hiddenLine xmlns="" xmlns:a14="http://schemas.microsoft.com/office/drawing/2010/main" w="9525">
+                <a14:hiddenLine xmlns:a14="http://schemas.microsoft.com/office/drawing/2010/main" xmlns="" w="9525">
                   <a:solidFill>
                     <a:srgbClr val="000000"/>
                   </a:solidFill>
@@ -3990,7 +3990,7 @@
             </a:ln>
             <a:extLst>
               <a:ext uri="{91240B29-F687-4f45-9708-019B960494DF}">
-                <a14:hiddenLine xmlns="" xmlns:a14="http://schemas.microsoft.com/office/drawing/2010/main" w="9525">
+                <a14:hiddenLine xmlns:a14="http://schemas.microsoft.com/office/drawing/2010/main" xmlns="" w="9525">
                   <a:solidFill>
                     <a:srgbClr val="000000"/>
                   </a:solidFill>
@@ -4110,7 +4110,7 @@
             </a:ln>
             <a:extLst>
               <a:ext uri="{91240B29-F687-4f45-9708-019B960494DF}">
-                <a14:hiddenLine xmlns="" xmlns:a14="http://schemas.microsoft.com/office/drawing/2010/main" w="9525">
+                <a14:hiddenLine xmlns:a14="http://schemas.microsoft.com/office/drawing/2010/main" xmlns="" w="9525">
                   <a:solidFill>
                     <a:srgbClr val="000000"/>
                   </a:solidFill>
@@ -4178,7 +4178,7 @@
             </a:ln>
             <a:extLst>
               <a:ext uri="{91240B29-F687-4f45-9708-019B960494DF}">
-                <a14:hiddenLine xmlns="" xmlns:a14="http://schemas.microsoft.com/office/drawing/2010/main" w="9525">
+                <a14:hiddenLine xmlns:a14="http://schemas.microsoft.com/office/drawing/2010/main" xmlns="" w="9525">
                   <a:solidFill>
                     <a:srgbClr val="000000"/>
                   </a:solidFill>
@@ -4268,7 +4268,7 @@
             </a:ln>
             <a:extLst>
               <a:ext uri="{91240B29-F687-4f45-9708-019B960494DF}">
-                <a14:hiddenLine xmlns="" xmlns:a14="http://schemas.microsoft.com/office/drawing/2010/main" w="9525">
+                <a14:hiddenLine xmlns:a14="http://schemas.microsoft.com/office/drawing/2010/main" xmlns="" w="9525">
                   <a:solidFill>
                     <a:srgbClr val="000000"/>
                   </a:solidFill>
@@ -4408,7 +4408,7 @@
           <a:p>
             <a:fld id="{841D4EFB-1649-4F74-89D1-9FCA056B78EF}" type="datetimeFigureOut">
               <a:rPr lang="en-US" smtClean="0"/>
-              <a:t>16-Jan-15</a:t>
+              <a:t>17-Jan-15</a:t>
             </a:fld>
             <a:endParaRPr lang="en-US"/>
           </a:p>
@@ -4675,7 +4675,7 @@
           <a:p>
             <a:fld id="{841D4EFB-1649-4F74-89D1-9FCA056B78EF}" type="datetimeFigureOut">
               <a:rPr lang="en-US" smtClean="0"/>
-              <a:t>16-Jan-15</a:t>
+              <a:t>17-Jan-15</a:t>
             </a:fld>
             <a:endParaRPr lang="en-US"/>
           </a:p>
@@ -4871,7 +4871,7 @@
           <a:p>
             <a:fld id="{841D4EFB-1649-4F74-89D1-9FCA056B78EF}" type="datetimeFigureOut">
               <a:rPr lang="en-US" smtClean="0"/>
-              <a:t>16-Jan-15</a:t>
+              <a:t>17-Jan-15</a:t>
             </a:fld>
             <a:endParaRPr lang="en-US"/>
           </a:p>
@@ -5134,7 +5134,7 @@
           <a:p>
             <a:fld id="{841D4EFB-1649-4F74-89D1-9FCA056B78EF}" type="datetimeFigureOut">
               <a:rPr lang="en-US" smtClean="0"/>
-              <a:t>16-Jan-15</a:t>
+              <a:t>17-Jan-15</a:t>
             </a:fld>
             <a:endParaRPr lang="en-US"/>
           </a:p>
@@ -5568,7 +5568,7 @@
           <a:p>
             <a:fld id="{841D4EFB-1649-4F74-89D1-9FCA056B78EF}" type="datetimeFigureOut">
               <a:rPr lang="en-US" smtClean="0"/>
-              <a:t>16-Jan-15</a:t>
+              <a:t>17-Jan-15</a:t>
             </a:fld>
             <a:endParaRPr lang="en-US"/>
           </a:p>
@@ -6114,7 +6114,7 @@
           <a:p>
             <a:fld id="{841D4EFB-1649-4F74-89D1-9FCA056B78EF}" type="datetimeFigureOut">
               <a:rPr lang="en-US" smtClean="0"/>
-              <a:t>16-Jan-15</a:t>
+              <a:t>17-Jan-15</a:t>
             </a:fld>
             <a:endParaRPr lang="en-US"/>
           </a:p>
@@ -6834,7 +6834,7 @@
           <a:p>
             <a:fld id="{841D4EFB-1649-4F74-89D1-9FCA056B78EF}" type="datetimeFigureOut">
               <a:rPr lang="en-US" smtClean="0"/>
-              <a:t>16-Jan-15</a:t>
+              <a:t>17-Jan-15</a:t>
             </a:fld>
             <a:endParaRPr lang="en-US"/>
           </a:p>
@@ -7004,7 +7004,7 @@
           <a:p>
             <a:fld id="{841D4EFB-1649-4F74-89D1-9FCA056B78EF}" type="datetimeFigureOut">
               <a:rPr lang="en-US" smtClean="0"/>
-              <a:t>16-Jan-15</a:t>
+              <a:t>17-Jan-15</a:t>
             </a:fld>
             <a:endParaRPr lang="en-US"/>
           </a:p>
@@ -7184,7 +7184,7 @@
           <a:p>
             <a:fld id="{841D4EFB-1649-4F74-89D1-9FCA056B78EF}" type="datetimeFigureOut">
               <a:rPr lang="en-US" smtClean="0"/>
-              <a:t>16-Jan-15</a:t>
+              <a:t>17-Jan-15</a:t>
             </a:fld>
             <a:endParaRPr lang="en-US"/>
           </a:p>
@@ -7354,7 +7354,7 @@
           <a:p>
             <a:fld id="{841D4EFB-1649-4F74-89D1-9FCA056B78EF}" type="datetimeFigureOut">
               <a:rPr lang="en-US" smtClean="0"/>
-              <a:t>16-Jan-15</a:t>
+              <a:t>17-Jan-15</a:t>
             </a:fld>
             <a:endParaRPr lang="en-US"/>
           </a:p>
@@ -7604,7 +7604,7 @@
           <a:p>
             <a:fld id="{841D4EFB-1649-4F74-89D1-9FCA056B78EF}" type="datetimeFigureOut">
               <a:rPr lang="en-US" smtClean="0"/>
-              <a:t>16-Jan-15</a:t>
+              <a:t>17-Jan-15</a:t>
             </a:fld>
             <a:endParaRPr lang="en-US"/>
           </a:p>
@@ -7836,7 +7836,7 @@
           <a:p>
             <a:fld id="{841D4EFB-1649-4F74-89D1-9FCA056B78EF}" type="datetimeFigureOut">
               <a:rPr lang="en-US" smtClean="0"/>
-              <a:t>16-Jan-15</a:t>
+              <a:t>17-Jan-15</a:t>
             </a:fld>
             <a:endParaRPr lang="en-US"/>
           </a:p>
@@ -8217,7 +8217,7 @@
           <a:p>
             <a:fld id="{841D4EFB-1649-4F74-89D1-9FCA056B78EF}" type="datetimeFigureOut">
               <a:rPr lang="en-US" smtClean="0"/>
-              <a:t>16-Jan-15</a:t>
+              <a:t>17-Jan-15</a:t>
             </a:fld>
             <a:endParaRPr lang="en-US"/>
           </a:p>
@@ -8335,7 +8335,7 @@
           <a:p>
             <a:fld id="{841D4EFB-1649-4F74-89D1-9FCA056B78EF}" type="datetimeFigureOut">
               <a:rPr lang="en-US" smtClean="0"/>
-              <a:t>16-Jan-15</a:t>
+              <a:t>17-Jan-15</a:t>
             </a:fld>
             <a:endParaRPr lang="en-US"/>
           </a:p>
@@ -8430,7 +8430,7 @@
           <a:p>
             <a:fld id="{841D4EFB-1649-4F74-89D1-9FCA056B78EF}" type="datetimeFigureOut">
               <a:rPr lang="en-US" smtClean="0"/>
-              <a:t>16-Jan-15</a:t>
+              <a:t>17-Jan-15</a:t>
             </a:fld>
             <a:endParaRPr lang="en-US"/>
           </a:p>
@@ -8679,7 +8679,7 @@
           <a:p>
             <a:fld id="{841D4EFB-1649-4F74-89D1-9FCA056B78EF}" type="datetimeFigureOut">
               <a:rPr lang="en-US" smtClean="0"/>
-              <a:t>16-Jan-15</a:t>
+              <a:t>17-Jan-15</a:t>
             </a:fld>
             <a:endParaRPr lang="en-US"/>
           </a:p>
@@ -8959,7 +8959,7 @@
           <a:p>
             <a:fld id="{841D4EFB-1649-4F74-89D1-9FCA056B78EF}" type="datetimeFigureOut">
               <a:rPr lang="en-US" smtClean="0"/>
-              <a:t>16-Jan-15</a:t>
+              <a:t>17-Jan-15</a:t>
             </a:fld>
             <a:endParaRPr lang="en-US"/>
           </a:p>
@@ -9075,7 +9075,7 @@
           <a:noFill/>
           <a:extLst>
             <a:ext uri="{909E8E84-426E-40dd-AFC4-6F175D3DCCD1}">
-              <a14:hiddenFill xmlns="" xmlns:a14="http://schemas.microsoft.com/office/drawing/2010/main">
+              <a14:hiddenFill xmlns:a14="http://schemas.microsoft.com/office/drawing/2010/main" xmlns="">
                 <a:solidFill>
                   <a:srgbClr val="FFFFFF"/>
                 </a:solidFill>
@@ -9149,7 +9149,7 @@
               </a:ln>
               <a:extLst>
                 <a:ext uri="{91240B29-F687-4f45-9708-019B960494DF}">
-                  <a14:hiddenLine xmlns="" xmlns:a14="http://schemas.microsoft.com/office/drawing/2010/main" w="9525">
+                  <a14:hiddenLine xmlns:a14="http://schemas.microsoft.com/office/drawing/2010/main" xmlns="" w="9525">
                     <a:solidFill>
                       <a:srgbClr val="000000"/>
                     </a:solidFill>
@@ -9239,7 +9239,7 @@
               </a:ln>
               <a:extLst>
                 <a:ext uri="{91240B29-F687-4f45-9708-019B960494DF}">
-                  <a14:hiddenLine xmlns="" xmlns:a14="http://schemas.microsoft.com/office/drawing/2010/main" w="9525">
+                  <a14:hiddenLine xmlns:a14="http://schemas.microsoft.com/office/drawing/2010/main" xmlns="" w="9525">
                     <a:solidFill>
                       <a:srgbClr val="000000"/>
                     </a:solidFill>
@@ -9329,7 +9329,7 @@
               </a:ln>
               <a:extLst>
                 <a:ext uri="{91240B29-F687-4f45-9708-019B960494DF}">
-                  <a14:hiddenLine xmlns="" xmlns:a14="http://schemas.microsoft.com/office/drawing/2010/main" w="9525">
+                  <a14:hiddenLine xmlns:a14="http://schemas.microsoft.com/office/drawing/2010/main" xmlns="" w="9525">
                     <a:solidFill>
                       <a:srgbClr val="000000"/>
                     </a:solidFill>
@@ -9391,7 +9391,7 @@
               </a:ln>
               <a:extLst>
                 <a:ext uri="{91240B29-F687-4f45-9708-019B960494DF}">
-                  <a14:hiddenLine xmlns="" xmlns:a14="http://schemas.microsoft.com/office/drawing/2010/main" w="9525">
+                  <a14:hiddenLine xmlns:a14="http://schemas.microsoft.com/office/drawing/2010/main" xmlns="" w="9525">
                     <a:solidFill>
                       <a:srgbClr val="000000"/>
                     </a:solidFill>
@@ -9481,7 +9481,7 @@
               </a:ln>
               <a:extLst>
                 <a:ext uri="{91240B29-F687-4f45-9708-019B960494DF}">
-                  <a14:hiddenLine xmlns="" xmlns:a14="http://schemas.microsoft.com/office/drawing/2010/main" w="9525">
+                  <a14:hiddenLine xmlns:a14="http://schemas.microsoft.com/office/drawing/2010/main" xmlns="" w="9525">
                     <a:solidFill>
                       <a:srgbClr val="000000"/>
                     </a:solidFill>
@@ -9543,7 +9543,7 @@
               </a:ln>
               <a:extLst>
                 <a:ext uri="{91240B29-F687-4f45-9708-019B960494DF}">
-                  <a14:hiddenLine xmlns="" xmlns:a14="http://schemas.microsoft.com/office/drawing/2010/main" w="9525">
+                  <a14:hiddenLine xmlns:a14="http://schemas.microsoft.com/office/drawing/2010/main" xmlns="" w="9525">
                     <a:solidFill>
                       <a:srgbClr val="000000"/>
                     </a:solidFill>
@@ -9605,7 +9605,7 @@
               </a:ln>
               <a:extLst>
                 <a:ext uri="{91240B29-F687-4f45-9708-019B960494DF}">
-                  <a14:hiddenLine xmlns="" xmlns:a14="http://schemas.microsoft.com/office/drawing/2010/main" w="9525">
+                  <a14:hiddenLine xmlns:a14="http://schemas.microsoft.com/office/drawing/2010/main" xmlns="" w="9525">
                     <a:solidFill>
                       <a:srgbClr val="000000"/>
                     </a:solidFill>
@@ -9695,7 +9695,7 @@
               </a:ln>
               <a:extLst>
                 <a:ext uri="{91240B29-F687-4f45-9708-019B960494DF}">
-                  <a14:hiddenLine xmlns="" xmlns:a14="http://schemas.microsoft.com/office/drawing/2010/main" w="9525">
+                  <a14:hiddenLine xmlns:a14="http://schemas.microsoft.com/office/drawing/2010/main" xmlns="" w="9525">
                     <a:solidFill>
                       <a:srgbClr val="000000"/>
                     </a:solidFill>
@@ -9785,7 +9785,7 @@
               </a:ln>
               <a:extLst>
                 <a:ext uri="{91240B29-F687-4f45-9708-019B960494DF}">
-                  <a14:hiddenLine xmlns="" xmlns:a14="http://schemas.microsoft.com/office/drawing/2010/main" w="9525">
+                  <a14:hiddenLine xmlns:a14="http://schemas.microsoft.com/office/drawing/2010/main" xmlns="" w="9525">
                     <a:solidFill>
                       <a:srgbClr val="000000"/>
                     </a:solidFill>
@@ -9847,7 +9847,7 @@
               </a:ln>
               <a:extLst>
                 <a:ext uri="{91240B29-F687-4f45-9708-019B960494DF}">
-                  <a14:hiddenLine xmlns="" xmlns:a14="http://schemas.microsoft.com/office/drawing/2010/main" w="9525">
+                  <a14:hiddenLine xmlns:a14="http://schemas.microsoft.com/office/drawing/2010/main" xmlns="" w="9525">
                     <a:solidFill>
                       <a:srgbClr val="000000"/>
                     </a:solidFill>
@@ -9957,7 +9957,7 @@
               </a:ln>
               <a:extLst>
                 <a:ext uri="{91240B29-F687-4f45-9708-019B960494DF}">
-                  <a14:hiddenLine xmlns="" xmlns:a14="http://schemas.microsoft.com/office/drawing/2010/main" w="9525">
+                  <a14:hiddenLine xmlns:a14="http://schemas.microsoft.com/office/drawing/2010/main" xmlns="" w="9525">
                     <a:solidFill>
                       <a:srgbClr val="000000"/>
                     </a:solidFill>
@@ -10041,7 +10041,7 @@
               </a:ln>
               <a:extLst>
                 <a:ext uri="{91240B29-F687-4f45-9708-019B960494DF}">
-                  <a14:hiddenLine xmlns="" xmlns:a14="http://schemas.microsoft.com/office/drawing/2010/main" w="9525">
+                  <a14:hiddenLine xmlns:a14="http://schemas.microsoft.com/office/drawing/2010/main" xmlns="" w="9525">
                     <a:solidFill>
                       <a:srgbClr val="000000"/>
                     </a:solidFill>
@@ -10103,7 +10103,7 @@
               </a:ln>
               <a:extLst>
                 <a:ext uri="{91240B29-F687-4f45-9708-019B960494DF}">
-                  <a14:hiddenLine xmlns="" xmlns:a14="http://schemas.microsoft.com/office/drawing/2010/main" w="9525">
+                  <a14:hiddenLine xmlns:a14="http://schemas.microsoft.com/office/drawing/2010/main" xmlns="" w="9525">
                     <a:solidFill>
                       <a:srgbClr val="000000"/>
                     </a:solidFill>
@@ -10165,7 +10165,7 @@
               </a:ln>
               <a:extLst>
                 <a:ext uri="{91240B29-F687-4f45-9708-019B960494DF}">
-                  <a14:hiddenLine xmlns="" xmlns:a14="http://schemas.microsoft.com/office/drawing/2010/main" w="9525">
+                  <a14:hiddenLine xmlns:a14="http://schemas.microsoft.com/office/drawing/2010/main" xmlns="" w="9525">
                     <a:solidFill>
                       <a:srgbClr val="000000"/>
                     </a:solidFill>
@@ -10255,7 +10255,7 @@
               </a:ln>
               <a:extLst>
                 <a:ext uri="{91240B29-F687-4f45-9708-019B960494DF}">
-                  <a14:hiddenLine xmlns="" xmlns:a14="http://schemas.microsoft.com/office/drawing/2010/main" w="9525">
+                  <a14:hiddenLine xmlns:a14="http://schemas.microsoft.com/office/drawing/2010/main" xmlns="" w="9525">
                     <a:solidFill>
                       <a:srgbClr val="000000"/>
                     </a:solidFill>
@@ -10289,7 +10289,7 @@
               </a:ln>
               <a:extLst>
                 <a:ext uri="{91240B29-F687-4f45-9708-019B960494DF}">
-                  <a14:hiddenLine xmlns="" xmlns:a14="http://schemas.microsoft.com/office/drawing/2010/main" w="9525">
+                  <a14:hiddenLine xmlns:a14="http://schemas.microsoft.com/office/drawing/2010/main" xmlns="" w="9525">
                     <a:solidFill>
                       <a:srgbClr val="000000"/>
                     </a:solidFill>
@@ -10354,7 +10354,7 @@
               </a:ln>
               <a:extLst>
                 <a:ext uri="{91240B29-F687-4f45-9708-019B960494DF}">
-                  <a14:hiddenLine xmlns="" xmlns:a14="http://schemas.microsoft.com/office/drawing/2010/main" w="9525">
+                  <a14:hiddenLine xmlns:a14="http://schemas.microsoft.com/office/drawing/2010/main" xmlns="" w="9525">
                     <a:solidFill>
                       <a:srgbClr val="000000"/>
                     </a:solidFill>
@@ -10444,7 +10444,7 @@
               </a:ln>
               <a:extLst>
                 <a:ext uri="{91240B29-F687-4f45-9708-019B960494DF}">
-                  <a14:hiddenLine xmlns="" xmlns:a14="http://schemas.microsoft.com/office/drawing/2010/main" w="9525">
+                  <a14:hiddenLine xmlns:a14="http://schemas.microsoft.com/office/drawing/2010/main" xmlns="" w="9525">
                     <a:solidFill>
                       <a:srgbClr val="000000"/>
                     </a:solidFill>
@@ -10506,7 +10506,7 @@
               </a:ln>
               <a:extLst>
                 <a:ext uri="{91240B29-F687-4f45-9708-019B960494DF}">
-                  <a14:hiddenLine xmlns="" xmlns:a14="http://schemas.microsoft.com/office/drawing/2010/main" w="9525">
+                  <a14:hiddenLine xmlns:a14="http://schemas.microsoft.com/office/drawing/2010/main" xmlns="" w="9525">
                     <a:solidFill>
                       <a:srgbClr val="000000"/>
                     </a:solidFill>
@@ -10596,7 +10596,7 @@
               </a:ln>
               <a:extLst>
                 <a:ext uri="{91240B29-F687-4f45-9708-019B960494DF}">
-                  <a14:hiddenLine xmlns="" xmlns:a14="http://schemas.microsoft.com/office/drawing/2010/main" w="9525">
+                  <a14:hiddenLine xmlns:a14="http://schemas.microsoft.com/office/drawing/2010/main" xmlns="" w="9525">
                     <a:solidFill>
                       <a:srgbClr val="000000"/>
                     </a:solidFill>
@@ -10661,7 +10661,7 @@
               </a:ln>
               <a:extLst>
                 <a:ext uri="{91240B29-F687-4f45-9708-019B960494DF}">
-                  <a14:hiddenLine xmlns="" xmlns:a14="http://schemas.microsoft.com/office/drawing/2010/main" w="9525">
+                  <a14:hiddenLine xmlns:a14="http://schemas.microsoft.com/office/drawing/2010/main" xmlns="" w="9525">
                     <a:solidFill>
                       <a:srgbClr val="000000"/>
                     </a:solidFill>
@@ -10723,7 +10723,7 @@
               </a:ln>
               <a:extLst>
                 <a:ext uri="{91240B29-F687-4f45-9708-019B960494DF}">
-                  <a14:hiddenLine xmlns="" xmlns:a14="http://schemas.microsoft.com/office/drawing/2010/main" w="9525">
+                  <a14:hiddenLine xmlns:a14="http://schemas.microsoft.com/office/drawing/2010/main" xmlns="" w="9525">
                     <a:solidFill>
                       <a:srgbClr val="000000"/>
                     </a:solidFill>
@@ -10813,7 +10813,7 @@
               </a:ln>
               <a:extLst>
                 <a:ext uri="{91240B29-F687-4f45-9708-019B960494DF}">
-                  <a14:hiddenLine xmlns="" xmlns:a14="http://schemas.microsoft.com/office/drawing/2010/main" w="9525">
+                  <a14:hiddenLine xmlns:a14="http://schemas.microsoft.com/office/drawing/2010/main" xmlns="" w="9525">
                     <a:solidFill>
                       <a:srgbClr val="000000"/>
                     </a:solidFill>
@@ -10903,7 +10903,7 @@
               </a:ln>
               <a:extLst>
                 <a:ext uri="{91240B29-F687-4f45-9708-019B960494DF}">
-                  <a14:hiddenLine xmlns="" xmlns:a14="http://schemas.microsoft.com/office/drawing/2010/main" w="9525">
+                  <a14:hiddenLine xmlns:a14="http://schemas.microsoft.com/office/drawing/2010/main" xmlns="" w="9525">
                     <a:solidFill>
                       <a:srgbClr val="000000"/>
                     </a:solidFill>
@@ -10968,7 +10968,7 @@
               </a:ln>
               <a:extLst>
                 <a:ext uri="{91240B29-F687-4f45-9708-019B960494DF}">
-                  <a14:hiddenLine xmlns="" xmlns:a14="http://schemas.microsoft.com/office/drawing/2010/main" w="9525">
+                  <a14:hiddenLine xmlns:a14="http://schemas.microsoft.com/office/drawing/2010/main" xmlns="" w="9525">
                     <a:solidFill>
                       <a:srgbClr val="000000"/>
                     </a:solidFill>
@@ -11088,7 +11088,7 @@
               </a:ln>
               <a:extLst>
                 <a:ext uri="{91240B29-F687-4f45-9708-019B960494DF}">
-                  <a14:hiddenLine xmlns="" xmlns:a14="http://schemas.microsoft.com/office/drawing/2010/main" w="9525">
+                  <a14:hiddenLine xmlns:a14="http://schemas.microsoft.com/office/drawing/2010/main" xmlns="" w="9525">
                     <a:solidFill>
                       <a:srgbClr val="000000"/>
                     </a:solidFill>
@@ -11186,7 +11186,7 @@
               </a:ln>
               <a:extLst>
                 <a:ext uri="{91240B29-F687-4f45-9708-019B960494DF}">
-                  <a14:hiddenLine xmlns="" xmlns:a14="http://schemas.microsoft.com/office/drawing/2010/main" w="9525">
+                  <a14:hiddenLine xmlns:a14="http://schemas.microsoft.com/office/drawing/2010/main" xmlns="" w="9525">
                     <a:solidFill>
                       <a:srgbClr val="000000"/>
                     </a:solidFill>
@@ -11301,7 +11301,7 @@
               </a:ln>
               <a:extLst>
                 <a:ext uri="{91240B29-F687-4f45-9708-019B960494DF}">
-                  <a14:hiddenLine xmlns="" xmlns:a14="http://schemas.microsoft.com/office/drawing/2010/main" w="9525">
+                  <a14:hiddenLine xmlns:a14="http://schemas.microsoft.com/office/drawing/2010/main" xmlns="" w="9525">
                     <a:solidFill>
                       <a:srgbClr val="000000"/>
                     </a:solidFill>
@@ -11391,7 +11391,7 @@
               </a:ln>
               <a:extLst>
                 <a:ext uri="{91240B29-F687-4f45-9708-019B960494DF}">
-                  <a14:hiddenLine xmlns="" xmlns:a14="http://schemas.microsoft.com/office/drawing/2010/main" w="9525">
+                  <a14:hiddenLine xmlns:a14="http://schemas.microsoft.com/office/drawing/2010/main" xmlns="" w="9525">
                     <a:solidFill>
                       <a:srgbClr val="000000"/>
                     </a:solidFill>
@@ -11456,7 +11456,7 @@
               </a:ln>
               <a:extLst>
                 <a:ext uri="{91240B29-F687-4f45-9708-019B960494DF}">
-                  <a14:hiddenLine xmlns="" xmlns:a14="http://schemas.microsoft.com/office/drawing/2010/main" w="9525">
+                  <a14:hiddenLine xmlns:a14="http://schemas.microsoft.com/office/drawing/2010/main" xmlns="" w="9525">
                     <a:solidFill>
                       <a:srgbClr val="000000"/>
                     </a:solidFill>
@@ -11546,7 +11546,7 @@
               </a:ln>
               <a:extLst>
                 <a:ext uri="{91240B29-F687-4f45-9708-019B960494DF}">
-                  <a14:hiddenLine xmlns="" xmlns:a14="http://schemas.microsoft.com/office/drawing/2010/main" w="9525">
+                  <a14:hiddenLine xmlns:a14="http://schemas.microsoft.com/office/drawing/2010/main" xmlns="" w="9525">
                     <a:solidFill>
                       <a:srgbClr val="000000"/>
                     </a:solidFill>
@@ -11614,7 +11614,7 @@
               </a:ln>
               <a:extLst>
                 <a:ext uri="{91240B29-F687-4f45-9708-019B960494DF}">
-                  <a14:hiddenLine xmlns="" xmlns:a14="http://schemas.microsoft.com/office/drawing/2010/main" w="9525">
+                  <a14:hiddenLine xmlns:a14="http://schemas.microsoft.com/office/drawing/2010/main" xmlns="" w="9525">
                     <a:solidFill>
                       <a:srgbClr val="000000"/>
                     </a:solidFill>
@@ -11704,7 +11704,7 @@
               </a:ln>
               <a:extLst>
                 <a:ext uri="{91240B29-F687-4f45-9708-019B960494DF}">
-                  <a14:hiddenLine xmlns="" xmlns:a14="http://schemas.microsoft.com/office/drawing/2010/main" w="9525">
+                  <a14:hiddenLine xmlns:a14="http://schemas.microsoft.com/office/drawing/2010/main" xmlns="" w="9525">
                     <a:solidFill>
                       <a:srgbClr val="000000"/>
                     </a:solidFill>
@@ -11772,7 +11772,7 @@
               </a:ln>
               <a:extLst>
                 <a:ext uri="{91240B29-F687-4f45-9708-019B960494DF}">
-                  <a14:hiddenLine xmlns="" xmlns:a14="http://schemas.microsoft.com/office/drawing/2010/main" w="9525">
+                  <a14:hiddenLine xmlns:a14="http://schemas.microsoft.com/office/drawing/2010/main" xmlns="" w="9525">
                     <a:solidFill>
                       <a:srgbClr val="000000"/>
                     </a:solidFill>
@@ -11862,7 +11862,7 @@
               </a:ln>
               <a:extLst>
                 <a:ext uri="{91240B29-F687-4f45-9708-019B960494DF}">
-                  <a14:hiddenLine xmlns="" xmlns:a14="http://schemas.microsoft.com/office/drawing/2010/main" w="9525">
+                  <a14:hiddenLine xmlns:a14="http://schemas.microsoft.com/office/drawing/2010/main" xmlns="" w="9525">
                     <a:solidFill>
                       <a:srgbClr val="000000"/>
                     </a:solidFill>
@@ -11896,7 +11896,7 @@
               </a:ln>
               <a:extLst>
                 <a:ext uri="{91240B29-F687-4f45-9708-019B960494DF}">
-                  <a14:hiddenLine xmlns="" xmlns:a14="http://schemas.microsoft.com/office/drawing/2010/main" w="9525">
+                  <a14:hiddenLine xmlns:a14="http://schemas.microsoft.com/office/drawing/2010/main" xmlns="" w="9525">
                     <a:solidFill>
                       <a:srgbClr val="000000"/>
                     </a:solidFill>
@@ -12036,7 +12036,7 @@
           <a:p>
             <a:fld id="{841D4EFB-1649-4F74-89D1-9FCA056B78EF}" type="datetimeFigureOut">
               <a:rPr lang="en-US" smtClean="0"/>
-              <a:t>16-Jan-15</a:t>
+              <a:t>17-Jan-15</a:t>
             </a:fld>
             <a:endParaRPr lang="en-US"/>
           </a:p>
@@ -12735,6 +12735,7 @@
           <a:bodyPr/>
           <a:lstStyle/>
           <a:p>
+            <a:pPr algn="ctr"/>
             <a:r>
               <a:rPr lang="bg-BG" dirty="0"/>
               <a:t>Търсене в стрингови </a:t>
@@ -12747,25 +12748,47 @@
           </a:p>
         </p:txBody>
       </p:sp>
-      <p:sp>
-        <p:nvSpPr>
-          <p:cNvPr id="3" name="Content Placeholder 2"/>
-          <p:cNvSpPr>
-            <a:spLocks noGrp="1"/>
-          </p:cNvSpPr>
-          <p:nvPr>
-            <p:ph idx="1"/>
-          </p:nvPr>
-        </p:nvSpPr>
-        <p:spPr/>
-        <p:txBody>
-          <a:bodyPr/>
-          <a:lstStyle/>
-          <a:p>
-            <a:endParaRPr lang="en-US"/>
-          </a:p>
-        </p:txBody>
-      </p:sp>
+      <p:pic>
+        <p:nvPicPr>
+          <p:cNvPr id="4098" name="Picture 2" descr="http://1.bp.blogspot.com/-1K9NpUDaB4M/UENWAGCAktI/AAAAAAAAMHA/uur1Q70DNHE/s1600/people_search_image_500_clr.png"/>
+          <p:cNvPicPr>
+            <a:picLocks noChangeAspect="1" noChangeArrowheads="1"/>
+          </p:cNvPicPr>
+          <p:nvPr/>
+        </p:nvPicPr>
+        <p:blipFill>
+          <a:blip r:embed="rId2">
+            <a:extLst>
+              <a:ext uri="{28A0092B-C50C-407E-A947-70E740481C1C}">
+                <a14:useLocalDpi xmlns:a14="http://schemas.microsoft.com/office/drawing/2010/main" val="0"/>
+              </a:ext>
+            </a:extLst>
+          </a:blip>
+          <a:srcRect/>
+          <a:stretch>
+            <a:fillRect/>
+          </a:stretch>
+        </p:blipFill>
+        <p:spPr bwMode="auto">
+          <a:xfrm>
+            <a:off x="3074193" y="2097088"/>
+            <a:ext cx="6040438" cy="3781315"/>
+          </a:xfrm>
+          <a:prstGeom prst="rect">
+            <a:avLst/>
+          </a:prstGeom>
+          <a:noFill/>
+          <a:extLst>
+            <a:ext uri="{909E8E84-426E-40DD-AFC4-6F175D3DCCD1}">
+              <a14:hiddenFill xmlns:a14="http://schemas.microsoft.com/office/drawing/2010/main">
+                <a:solidFill>
+                  <a:srgbClr val="FFFFFF"/>
+                </a:solidFill>
+              </a14:hiddenFill>
+            </a:ext>
+          </a:extLst>
+        </p:spPr>
+      </p:pic>
     </p:spTree>
     <p:extLst>
       <p:ext uri="{BB962C8B-B14F-4D97-AF65-F5344CB8AC3E}">
@@ -13087,25 +13110,47 @@
           </a:p>
         </p:txBody>
       </p:sp>
-      <p:sp>
-        <p:nvSpPr>
-          <p:cNvPr id="3" name="Content Placeholder 2"/>
-          <p:cNvSpPr>
-            <a:spLocks noGrp="1"/>
-          </p:cNvSpPr>
-          <p:nvPr>
-            <p:ph idx="1"/>
-          </p:nvPr>
-        </p:nvSpPr>
-        <p:spPr/>
-        <p:txBody>
-          <a:bodyPr/>
-          <a:lstStyle/>
-          <a:p>
-            <a:endParaRPr lang="en-US"/>
-          </a:p>
-        </p:txBody>
-      </p:sp>
+      <p:pic>
+        <p:nvPicPr>
+          <p:cNvPr id="5122" name="Picture 2" descr="http://www.swissmadesoftware.org/.imaging/stk/swissmadesoftware/w500/dam/companies/substring-gmbh/substringlogo/jcr:content/substringlogo.2014-08-07-09-26-37.png"/>
+          <p:cNvPicPr>
+            <a:picLocks noChangeAspect="1" noChangeArrowheads="1"/>
+          </p:cNvPicPr>
+          <p:nvPr/>
+        </p:nvPicPr>
+        <p:blipFill>
+          <a:blip r:embed="rId2">
+            <a:extLst>
+              <a:ext uri="{28A0092B-C50C-407E-A947-70E740481C1C}">
+                <a14:useLocalDpi xmlns:a14="http://schemas.microsoft.com/office/drawing/2010/main" val="0"/>
+              </a:ext>
+            </a:extLst>
+          </a:blip>
+          <a:srcRect/>
+          <a:stretch>
+            <a:fillRect/>
+          </a:stretch>
+        </p:blipFill>
+        <p:spPr bwMode="auto">
+          <a:xfrm>
+            <a:off x="3713162" y="2097088"/>
+            <a:ext cx="4762500" cy="3571875"/>
+          </a:xfrm>
+          <a:prstGeom prst="rect">
+            <a:avLst/>
+          </a:prstGeom>
+          <a:noFill/>
+          <a:extLst>
+            <a:ext uri="{909E8E84-426E-40DD-AFC4-6F175D3DCCD1}">
+              <a14:hiddenFill xmlns:a14="http://schemas.microsoft.com/office/drawing/2010/main">
+                <a:solidFill>
+                  <a:srgbClr val="FFFFFF"/>
+                </a:solidFill>
+              </a14:hiddenFill>
+            </a:ext>
+          </a:extLst>
+        </p:spPr>
+      </p:pic>
     </p:spTree>
     <p:extLst>
       <p:ext uri="{BB962C8B-B14F-4D97-AF65-F5344CB8AC3E}">
@@ -13282,6 +13327,47 @@
           </a:p>
         </p:txBody>
       </p:sp>
+      <p:pic>
+        <p:nvPicPr>
+          <p:cNvPr id="6146" name="Picture 2" descr="http://www.greekshares.com/uploads/image/4d127846_00701-axe-stock-split(1).jpeg"/>
+          <p:cNvPicPr>
+            <a:picLocks noChangeAspect="1" noChangeArrowheads="1"/>
+          </p:cNvPicPr>
+          <p:nvPr/>
+        </p:nvPicPr>
+        <p:blipFill>
+          <a:blip r:embed="rId2">
+            <a:extLst>
+              <a:ext uri="{28A0092B-C50C-407E-A947-70E740481C1C}">
+                <a14:useLocalDpi xmlns:a14="http://schemas.microsoft.com/office/drawing/2010/main" val="0"/>
+              </a:ext>
+            </a:extLst>
+          </a:blip>
+          <a:srcRect/>
+          <a:stretch>
+            <a:fillRect/>
+          </a:stretch>
+        </p:blipFill>
+        <p:spPr bwMode="auto">
+          <a:xfrm>
+            <a:off x="4008119" y="2097088"/>
+            <a:ext cx="4172585" cy="4172586"/>
+          </a:xfrm>
+          <a:prstGeom prst="rect">
+            <a:avLst/>
+          </a:prstGeom>
+          <a:noFill/>
+          <a:extLst>
+            <a:ext uri="{909E8E84-426E-40DD-AFC4-6F175D3DCCD1}">
+              <a14:hiddenFill xmlns:a14="http://schemas.microsoft.com/office/drawing/2010/main">
+                <a:solidFill>
+                  <a:srgbClr val="FFFFFF"/>
+                </a:solidFill>
+              </a14:hiddenFill>
+            </a:ext>
+          </a:extLst>
+        </p:spPr>
+      </p:pic>
     </p:spTree>
     <p:extLst>
       <p:ext uri="{BB962C8B-B14F-4D97-AF65-F5344CB8AC3E}">
@@ -13532,25 +13618,47 @@
           </a:p>
         </p:txBody>
       </p:sp>
-      <p:sp>
-        <p:nvSpPr>
-          <p:cNvPr id="3" name="Content Placeholder 2"/>
-          <p:cNvSpPr>
-            <a:spLocks noGrp="1"/>
-          </p:cNvSpPr>
-          <p:nvPr>
-            <p:ph idx="1"/>
-          </p:nvPr>
-        </p:nvSpPr>
-        <p:spPr/>
-        <p:txBody>
-          <a:bodyPr/>
-          <a:lstStyle/>
-          <a:p>
-            <a:endParaRPr lang="en-US" dirty="0"/>
-          </a:p>
-        </p:txBody>
-      </p:sp>
+      <p:pic>
+        <p:nvPicPr>
+          <p:cNvPr id="7170" name="Picture 2" descr="http://2.bp.blogspot.com/-8cqZlVj9mbQ/UD0F4CZ3oNI/AAAAAAAAAIw/9GyqoFp6c9k/s1600/java-logo.jpg"/>
+          <p:cNvPicPr>
+            <a:picLocks noChangeAspect="1" noChangeArrowheads="1"/>
+          </p:cNvPicPr>
+          <p:nvPr/>
+        </p:nvPicPr>
+        <p:blipFill>
+          <a:blip r:embed="rId2">
+            <a:extLst>
+              <a:ext uri="{28A0092B-C50C-407E-A947-70E740481C1C}">
+                <a14:useLocalDpi xmlns:a14="http://schemas.microsoft.com/office/drawing/2010/main" val="0"/>
+              </a:ext>
+            </a:extLst>
+          </a:blip>
+          <a:srcRect/>
+          <a:stretch>
+            <a:fillRect/>
+          </a:stretch>
+        </p:blipFill>
+        <p:spPr bwMode="auto">
+          <a:xfrm>
+            <a:off x="4042853" y="2097088"/>
+            <a:ext cx="4103117" cy="4103117"/>
+          </a:xfrm>
+          <a:prstGeom prst="rect">
+            <a:avLst/>
+          </a:prstGeom>
+          <a:noFill/>
+          <a:extLst>
+            <a:ext uri="{909E8E84-426E-40DD-AFC4-6F175D3DCCD1}">
+              <a14:hiddenFill xmlns:a14="http://schemas.microsoft.com/office/drawing/2010/main">
+                <a:solidFill>
+                  <a:srgbClr val="FFFFFF"/>
+                </a:solidFill>
+              </a14:hiddenFill>
+            </a:ext>
+          </a:extLst>
+        </p:spPr>
+      </p:pic>
     </p:spTree>
     <p:extLst>
       <p:ext uri="{BB962C8B-B14F-4D97-AF65-F5344CB8AC3E}">
@@ -14114,25 +14222,47 @@
           </a:p>
         </p:txBody>
       </p:sp>
-      <p:sp>
-        <p:nvSpPr>
-          <p:cNvPr id="3" name="Content Placeholder 2"/>
-          <p:cNvSpPr>
-            <a:spLocks noGrp="1"/>
-          </p:cNvSpPr>
-          <p:nvPr>
-            <p:ph idx="1"/>
-          </p:nvPr>
-        </p:nvSpPr>
-        <p:spPr/>
-        <p:txBody>
-          <a:bodyPr/>
-          <a:lstStyle/>
-          <a:p>
-            <a:endParaRPr lang="en-US"/>
-          </a:p>
-        </p:txBody>
-      </p:sp>
+      <p:pic>
+        <p:nvPicPr>
+          <p:cNvPr id="1026" name="Picture 2" descr="http://2.bp.blogspot.com/-XYeqoQdXEpA/VEqt7kfjnCI/AAAAAAAADZY/3WGQNjwNlN8/s1600/Java_Images.png"/>
+          <p:cNvPicPr>
+            <a:picLocks noChangeAspect="1" noChangeArrowheads="1"/>
+          </p:cNvPicPr>
+          <p:nvPr/>
+        </p:nvPicPr>
+        <p:blipFill>
+          <a:blip r:embed="rId2">
+            <a:extLst>
+              <a:ext uri="{28A0092B-C50C-407E-A947-70E740481C1C}">
+                <a14:useLocalDpi xmlns:a14="http://schemas.microsoft.com/office/drawing/2010/main" val="0"/>
+              </a:ext>
+            </a:extLst>
+          </a:blip>
+          <a:srcRect/>
+          <a:stretch>
+            <a:fillRect/>
+          </a:stretch>
+        </p:blipFill>
+        <p:spPr bwMode="auto">
+          <a:xfrm>
+            <a:off x="3527424" y="2097088"/>
+            <a:ext cx="5133975" cy="3743325"/>
+          </a:xfrm>
+          <a:prstGeom prst="rect">
+            <a:avLst/>
+          </a:prstGeom>
+          <a:noFill/>
+          <a:extLst>
+            <a:ext uri="{909E8E84-426E-40DD-AFC4-6F175D3DCCD1}">
+              <a14:hiddenFill xmlns:a14="http://schemas.microsoft.com/office/drawing/2010/main">
+                <a:solidFill>
+                  <a:srgbClr val="FFFFFF"/>
+                </a:solidFill>
+              </a14:hiddenFill>
+            </a:ext>
+          </a:extLst>
+        </p:spPr>
+      </p:pic>
     </p:spTree>
     <p:extLst>
       <p:ext uri="{BB962C8B-B14F-4D97-AF65-F5344CB8AC3E}">
@@ -14404,6 +14534,47 @@
           </a:p>
         </p:txBody>
       </p:sp>
+      <p:pic>
+        <p:nvPicPr>
+          <p:cNvPr id="2050" name="Picture 2" descr="http://www.sothinkmedia.com/images/compare.jpg"/>
+          <p:cNvPicPr>
+            <a:picLocks noChangeAspect="1" noChangeArrowheads="1"/>
+          </p:cNvPicPr>
+          <p:nvPr/>
+        </p:nvPicPr>
+        <p:blipFill>
+          <a:blip r:embed="rId2">
+            <a:extLst>
+              <a:ext uri="{28A0092B-C50C-407E-A947-70E740481C1C}">
+                <a14:useLocalDpi xmlns:a14="http://schemas.microsoft.com/office/drawing/2010/main" val="0"/>
+              </a:ext>
+            </a:extLst>
+          </a:blip>
+          <a:srcRect/>
+          <a:stretch>
+            <a:fillRect/>
+          </a:stretch>
+        </p:blipFill>
+        <p:spPr bwMode="auto">
+          <a:xfrm>
+            <a:off x="2959607" y="2097088"/>
+            <a:ext cx="6269609" cy="4603215"/>
+          </a:xfrm>
+          <a:prstGeom prst="rect">
+            <a:avLst/>
+          </a:prstGeom>
+          <a:noFill/>
+          <a:extLst>
+            <a:ext uri="{909E8E84-426E-40DD-AFC4-6F175D3DCCD1}">
+              <a14:hiddenFill xmlns:a14="http://schemas.microsoft.com/office/drawing/2010/main">
+                <a:solidFill>
+                  <a:srgbClr val="FFFFFF"/>
+                </a:solidFill>
+              </a14:hiddenFill>
+            </a:ext>
+          </a:extLst>
+        </p:spPr>
+      </p:pic>
     </p:spTree>
     <p:extLst>
       <p:ext uri="{BB962C8B-B14F-4D97-AF65-F5344CB8AC3E}">
@@ -14581,25 +14752,47 @@
           </a:p>
         </p:txBody>
       </p:sp>
-      <p:sp>
-        <p:nvSpPr>
-          <p:cNvPr id="3" name="Content Placeholder 2"/>
-          <p:cNvSpPr>
-            <a:spLocks noGrp="1"/>
-          </p:cNvSpPr>
-          <p:nvPr>
-            <p:ph idx="1"/>
-          </p:nvPr>
-        </p:nvSpPr>
-        <p:spPr/>
-        <p:txBody>
-          <a:bodyPr/>
-          <a:lstStyle/>
-          <a:p>
-            <a:endParaRPr lang="en-US"/>
-          </a:p>
-        </p:txBody>
-      </p:sp>
+      <p:pic>
+        <p:nvPicPr>
+          <p:cNvPr id="3074" name="Picture 2" descr="http://w3.cs.jmu.edu/mayfiecs/cs139/wk-03/concatenation.png"/>
+          <p:cNvPicPr>
+            <a:picLocks noChangeAspect="1" noChangeArrowheads="1"/>
+          </p:cNvPicPr>
+          <p:nvPr/>
+        </p:nvPicPr>
+        <p:blipFill>
+          <a:blip r:embed="rId2">
+            <a:extLst>
+              <a:ext uri="{28A0092B-C50C-407E-A947-70E740481C1C}">
+                <a14:useLocalDpi xmlns:a14="http://schemas.microsoft.com/office/drawing/2010/main" val="0"/>
+              </a:ext>
+            </a:extLst>
+          </a:blip>
+          <a:srcRect/>
+          <a:stretch>
+            <a:fillRect/>
+          </a:stretch>
+        </p:blipFill>
+        <p:spPr bwMode="auto">
+          <a:xfrm>
+            <a:off x="2491611" y="2097088"/>
+            <a:ext cx="7205602" cy="2938208"/>
+          </a:xfrm>
+          <a:prstGeom prst="rect">
+            <a:avLst/>
+          </a:prstGeom>
+          <a:noFill/>
+          <a:extLst>
+            <a:ext uri="{909E8E84-426E-40DD-AFC4-6F175D3DCCD1}">
+              <a14:hiddenFill xmlns:a14="http://schemas.microsoft.com/office/drawing/2010/main">
+                <a:solidFill>
+                  <a:srgbClr val="FFFFFF"/>
+                </a:solidFill>
+              </a14:hiddenFill>
+            </a:ext>
+          </a:extLst>
+        </p:spPr>
+      </p:pic>
     </p:spTree>
     <p:extLst>
       <p:ext uri="{BB962C8B-B14F-4D97-AF65-F5344CB8AC3E}">

</xml_diff>